<commit_message>
push because of new laptop
As I get a new laptop, I have to push the current changes so that nothing is lost.
</commit_message>
<xml_diff>
--- a/images/stickyNotes.pptx
+++ b/images/stickyNotes.pptx
@@ -5,19 +5,20 @@
     <p:sldMasterId id="2147483648" r:id="rId1"/>
   </p:sldMasterIdLst>
   <p:notesMasterIdLst>
-    <p:notesMasterId r:id="rId12"/>
+    <p:notesMasterId r:id="rId13"/>
   </p:notesMasterIdLst>
   <p:sldIdLst>
-    <p:sldId id="257" r:id="rId2"/>
-    <p:sldId id="261" r:id="rId3"/>
-    <p:sldId id="258" r:id="rId4"/>
-    <p:sldId id="262" r:id="rId5"/>
-    <p:sldId id="256" r:id="rId6"/>
-    <p:sldId id="264" r:id="rId7"/>
-    <p:sldId id="263" r:id="rId8"/>
-    <p:sldId id="260" r:id="rId9"/>
-    <p:sldId id="265" r:id="rId10"/>
-    <p:sldId id="266" r:id="rId11"/>
+    <p:sldId id="267" r:id="rId2"/>
+    <p:sldId id="257" r:id="rId3"/>
+    <p:sldId id="261" r:id="rId4"/>
+    <p:sldId id="258" r:id="rId5"/>
+    <p:sldId id="262" r:id="rId6"/>
+    <p:sldId id="256" r:id="rId7"/>
+    <p:sldId id="264" r:id="rId8"/>
+    <p:sldId id="263" r:id="rId9"/>
+    <p:sldId id="260" r:id="rId10"/>
+    <p:sldId id="265" r:id="rId11"/>
+    <p:sldId id="266" r:id="rId12"/>
   </p:sldIdLst>
   <p:sldSz cx="12192000" cy="6858000"/>
   <p:notesSz cx="6858000" cy="9144000"/>
@@ -206,7 +207,7 @@
           <a:p>
             <a:fld id="{EC75A01B-47F4-4A72-B313-CDCBEB24B9AA}" type="datetimeFigureOut">
               <a:rPr lang="de-CH" smtClean="0"/>
-              <a:t>22.11.2019</a:t>
+              <a:t>19.12.2019</a:t>
             </a:fld>
             <a:endParaRPr lang="de-CH"/>
           </a:p>
@@ -519,8 +520,12 @@
           <a:lstStyle/>
           <a:p>
             <a:r>
+              <a:rPr lang="de-CH" dirty="0" smtClean="0"/>
+              <a:t>Panel-</a:t>
+            </a:r>
+            <a:r>
               <a:rPr lang="de-CH" dirty="0" err="1" smtClean="0"/>
-              <a:t>Offering</a:t>
+              <a:t>example</a:t>
             </a:r>
             <a:endParaRPr lang="de-CH" dirty="0"/>
           </a:p>
@@ -552,7 +557,7 @@
     </p:spTree>
     <p:extLst>
       <p:ext uri="{BB962C8B-B14F-4D97-AF65-F5344CB8AC3E}">
-        <p14:creationId xmlns:p14="http://schemas.microsoft.com/office/powerpoint/2010/main" val="676400779"/>
+        <p14:creationId xmlns:p14="http://schemas.microsoft.com/office/powerpoint/2010/main" val="1086945389"/>
       </p:ext>
     </p:extLst>
   </p:cSld>
@@ -620,7 +625,15 @@
             </a:r>
             <a:r>
               <a:rPr lang="de-CH" baseline="0" dirty="0" smtClean="0"/>
-              <a:t> – Variable </a:t>
+              <a:t> – </a:t>
+            </a:r>
+            <a:r>
+              <a:rPr lang="de-CH" baseline="0" dirty="0" err="1" smtClean="0"/>
+              <a:t>fixed</a:t>
+            </a:r>
+            <a:r>
+              <a:rPr lang="de-CH" baseline="0" dirty="0" smtClean="0"/>
+              <a:t> </a:t>
             </a:r>
             <a:r>
               <a:rPr lang="de-CH" baseline="0" dirty="0" err="1" smtClean="0"/>
@@ -648,6 +661,110 @@
             <a:fld id="{4881369C-B37E-416F-A200-175D84A25902}" type="slidenum">
               <a:rPr lang="de-CH" smtClean="0"/>
               <a:t>10</a:t>
+            </a:fld>
+            <a:endParaRPr lang="de-CH"/>
+          </a:p>
+        </p:txBody>
+      </p:sp>
+    </p:spTree>
+    <p:extLst>
+      <p:ext uri="{BB962C8B-B14F-4D97-AF65-F5344CB8AC3E}">
+        <p14:creationId xmlns:p14="http://schemas.microsoft.com/office/powerpoint/2010/main" val="308482155"/>
+      </p:ext>
+    </p:extLst>
+  </p:cSld>
+  <p:clrMapOvr>
+    <a:masterClrMapping/>
+  </p:clrMapOvr>
+</p:notes>
+</file>
+
+<file path=ppt/notesSlides/notesSlide11.xml><?xml version="1.0" encoding="utf-8"?>
+<p:notes xmlns:a="http://schemas.openxmlformats.org/drawingml/2006/main" xmlns:r="http://schemas.openxmlformats.org/officeDocument/2006/relationships" xmlns:p="http://schemas.openxmlformats.org/presentationml/2006/main">
+  <p:cSld>
+    <p:spTree>
+      <p:nvGrpSpPr>
+        <p:cNvPr id="1" name=""/>
+        <p:cNvGrpSpPr/>
+        <p:nvPr/>
+      </p:nvGrpSpPr>
+      <p:grpSpPr>
+        <a:xfrm>
+          <a:off x="0" y="0"/>
+          <a:ext cx="0" cy="0"/>
+          <a:chOff x="0" y="0"/>
+          <a:chExt cx="0" cy="0"/>
+        </a:xfrm>
+      </p:grpSpPr>
+      <p:sp>
+        <p:nvSpPr>
+          <p:cNvPr id="2" name="Folienbildplatzhalter 1"/>
+          <p:cNvSpPr>
+            <a:spLocks noGrp="1" noRot="1" noChangeAspect="1"/>
+          </p:cNvSpPr>
+          <p:nvPr>
+            <p:ph type="sldImg"/>
+          </p:nvPr>
+        </p:nvSpPr>
+        <p:spPr/>
+      </p:sp>
+      <p:sp>
+        <p:nvSpPr>
+          <p:cNvPr id="3" name="Notizenplatzhalter 2"/>
+          <p:cNvSpPr>
+            <a:spLocks noGrp="1"/>
+          </p:cNvSpPr>
+          <p:nvPr>
+            <p:ph type="body" idx="1"/>
+          </p:nvPr>
+        </p:nvSpPr>
+        <p:spPr/>
+        <p:txBody>
+          <a:bodyPr/>
+          <a:lstStyle/>
+          <a:p>
+            <a:r>
+              <a:rPr lang="de-CH" dirty="0" err="1" smtClean="0"/>
+              <a:t>Cost</a:t>
+            </a:r>
+            <a:r>
+              <a:rPr lang="de-CH" baseline="0" dirty="0" smtClean="0"/>
+              <a:t> </a:t>
+            </a:r>
+            <a:r>
+              <a:rPr lang="de-CH" baseline="0" dirty="0" err="1" smtClean="0"/>
+              <a:t>Structure</a:t>
+            </a:r>
+            <a:r>
+              <a:rPr lang="de-CH" baseline="0" dirty="0" smtClean="0"/>
+              <a:t> – Variable </a:t>
+            </a:r>
+            <a:r>
+              <a:rPr lang="de-CH" baseline="0" dirty="0" err="1" smtClean="0"/>
+              <a:t>Costs</a:t>
+            </a:r>
+            <a:endParaRPr lang="de-CH" dirty="0"/>
+          </a:p>
+        </p:txBody>
+      </p:sp>
+      <p:sp>
+        <p:nvSpPr>
+          <p:cNvPr id="4" name="Foliennummernplatzhalter 3"/>
+          <p:cNvSpPr>
+            <a:spLocks noGrp="1"/>
+          </p:cNvSpPr>
+          <p:nvPr>
+            <p:ph type="sldNum" sz="quarter" idx="10"/>
+          </p:nvPr>
+        </p:nvSpPr>
+        <p:spPr/>
+        <p:txBody>
+          <a:bodyPr/>
+          <a:lstStyle/>
+          <a:p>
+            <a:fld id="{4881369C-B37E-416F-A200-175D84A25902}" type="slidenum">
+              <a:rPr lang="de-CH" smtClean="0"/>
+              <a:t>11</a:t>
             </a:fld>
             <a:endParaRPr lang="de-CH"/>
           </a:p>
@@ -710,27 +827,11 @@
           <a:bodyPr/>
           <a:lstStyle/>
           <a:p>
-            <a:pPr marL="0" marR="0" lvl="0" indent="0" algn="l" defTabSz="914400" rtl="0" eaLnBrk="1" fontAlgn="auto" latinLnBrk="0" hangingPunct="1">
-              <a:lnSpc>
-                <a:spcPct val="100000"/>
-              </a:lnSpc>
-              <a:spcBef>
-                <a:spcPts val="0"/>
-              </a:spcBef>
-              <a:spcAft>
-                <a:spcPts val="0"/>
-              </a:spcAft>
-              <a:buClrTx/>
-              <a:buSzTx/>
-              <a:buFontTx/>
-              <a:buNone/>
-              <a:tabLst/>
-              <a:defRPr/>
-            </a:pPr>
-            <a:r>
-              <a:rPr lang="de-CH" dirty="0" smtClean="0"/>
-              <a:t>Customer Segments</a:t>
-            </a:r>
+            <a:r>
+              <a:rPr lang="de-CH" dirty="0" err="1" smtClean="0"/>
+              <a:t>Offering</a:t>
+            </a:r>
+            <a:endParaRPr lang="de-CH" dirty="0"/>
           </a:p>
         </p:txBody>
       </p:sp>
@@ -760,7 +861,7 @@
     </p:spTree>
     <p:extLst>
       <p:ext uri="{BB962C8B-B14F-4D97-AF65-F5344CB8AC3E}">
-        <p14:creationId xmlns:p14="http://schemas.microsoft.com/office/powerpoint/2010/main" val="1352097196"/>
+        <p14:creationId xmlns:p14="http://schemas.microsoft.com/office/powerpoint/2010/main" val="676400779"/>
       </p:ext>
     </p:extLst>
   </p:cSld>
@@ -814,15 +915,27 @@
           <a:bodyPr/>
           <a:lstStyle/>
           <a:p>
+            <a:pPr marL="0" marR="0" lvl="0" indent="0" algn="l" defTabSz="914400" rtl="0" eaLnBrk="1" fontAlgn="auto" latinLnBrk="0" hangingPunct="1">
+              <a:lnSpc>
+                <a:spcPct val="100000"/>
+              </a:lnSpc>
+              <a:spcBef>
+                <a:spcPts val="0"/>
+              </a:spcBef>
+              <a:spcAft>
+                <a:spcPts val="0"/>
+              </a:spcAft>
+              <a:buClrTx/>
+              <a:buSzTx/>
+              <a:buFontTx/>
+              <a:buNone/>
+              <a:tabLst/>
+              <a:defRPr/>
+            </a:pPr>
             <a:r>
               <a:rPr lang="de-CH" dirty="0" smtClean="0"/>
-              <a:t>Customer </a:t>
-            </a:r>
-            <a:r>
-              <a:rPr lang="de-CH" dirty="0" err="1" smtClean="0"/>
-              <a:t>Relationships</a:t>
-            </a:r>
-            <a:endParaRPr lang="de-CH" dirty="0"/>
+              <a:t>Customer Segments</a:t>
+            </a:r>
           </a:p>
         </p:txBody>
       </p:sp>
@@ -852,7 +965,7 @@
     </p:spTree>
     <p:extLst>
       <p:ext uri="{BB962C8B-B14F-4D97-AF65-F5344CB8AC3E}">
-        <p14:creationId xmlns:p14="http://schemas.microsoft.com/office/powerpoint/2010/main" val="3261446840"/>
+        <p14:creationId xmlns:p14="http://schemas.microsoft.com/office/powerpoint/2010/main" val="1352097196"/>
       </p:ext>
     </p:extLst>
   </p:cSld>
@@ -908,7 +1021,11 @@
           <a:p>
             <a:r>
               <a:rPr lang="de-CH" dirty="0" smtClean="0"/>
-              <a:t>Channels</a:t>
+              <a:t>Customer </a:t>
+            </a:r>
+            <a:r>
+              <a:rPr lang="de-CH" dirty="0" err="1" smtClean="0"/>
+              <a:t>Relationships</a:t>
             </a:r>
             <a:endParaRPr lang="de-CH" dirty="0"/>
           </a:p>
@@ -940,7 +1057,7 @@
     </p:spTree>
     <p:extLst>
       <p:ext uri="{BB962C8B-B14F-4D97-AF65-F5344CB8AC3E}">
-        <p14:creationId xmlns:p14="http://schemas.microsoft.com/office/powerpoint/2010/main" val="1501992440"/>
+        <p14:creationId xmlns:p14="http://schemas.microsoft.com/office/powerpoint/2010/main" val="3261446840"/>
       </p:ext>
     </p:extLst>
   </p:cSld>
@@ -996,11 +1113,7 @@
           <a:p>
             <a:r>
               <a:rPr lang="de-CH" dirty="0" smtClean="0"/>
-              <a:t>Key </a:t>
-            </a:r>
-            <a:r>
-              <a:rPr lang="de-CH" dirty="0" err="1" smtClean="0"/>
-              <a:t>Partnerships</a:t>
+              <a:t>Channels</a:t>
             </a:r>
             <a:endParaRPr lang="de-CH" dirty="0"/>
           </a:p>
@@ -1032,7 +1145,7 @@
     </p:spTree>
     <p:extLst>
       <p:ext uri="{BB962C8B-B14F-4D97-AF65-F5344CB8AC3E}">
-        <p14:creationId xmlns:p14="http://schemas.microsoft.com/office/powerpoint/2010/main" val="1513846329"/>
+        <p14:creationId xmlns:p14="http://schemas.microsoft.com/office/powerpoint/2010/main" val="1501992440"/>
       </p:ext>
     </p:extLst>
   </p:cSld>
@@ -1092,7 +1205,7 @@
             </a:r>
             <a:r>
               <a:rPr lang="de-CH" dirty="0" err="1" smtClean="0"/>
-              <a:t>Activities</a:t>
+              <a:t>Partnerships</a:t>
             </a:r>
             <a:endParaRPr lang="de-CH" dirty="0"/>
           </a:p>
@@ -1124,7 +1237,7 @@
     </p:spTree>
     <p:extLst>
       <p:ext uri="{BB962C8B-B14F-4D97-AF65-F5344CB8AC3E}">
-        <p14:creationId xmlns:p14="http://schemas.microsoft.com/office/powerpoint/2010/main" val="2799724258"/>
+        <p14:creationId xmlns:p14="http://schemas.microsoft.com/office/powerpoint/2010/main" val="1513846329"/>
       </p:ext>
     </p:extLst>
   </p:cSld>
@@ -1184,7 +1297,7 @@
             </a:r>
             <a:r>
               <a:rPr lang="de-CH" dirty="0" err="1" smtClean="0"/>
-              <a:t>Ressources</a:t>
+              <a:t>Activities</a:t>
             </a:r>
             <a:endParaRPr lang="de-CH" dirty="0"/>
           </a:p>
@@ -1216,7 +1329,7 @@
     </p:spTree>
     <p:extLst>
       <p:ext uri="{BB962C8B-B14F-4D97-AF65-F5344CB8AC3E}">
-        <p14:creationId xmlns:p14="http://schemas.microsoft.com/office/powerpoint/2010/main" val="2653983063"/>
+        <p14:creationId xmlns:p14="http://schemas.microsoft.com/office/powerpoint/2010/main" val="2799724258"/>
       </p:ext>
     </p:extLst>
   </p:cSld>
@@ -1270,27 +1383,15 @@
           <a:bodyPr/>
           <a:lstStyle/>
           <a:p>
-            <a:pPr marL="0" marR="0" lvl="0" indent="0" algn="l" defTabSz="914400" rtl="0" eaLnBrk="1" fontAlgn="auto" latinLnBrk="0" hangingPunct="1">
-              <a:lnSpc>
-                <a:spcPct val="100000"/>
-              </a:lnSpc>
-              <a:spcBef>
-                <a:spcPts val="0"/>
-              </a:spcBef>
-              <a:spcAft>
-                <a:spcPts val="0"/>
-              </a:spcAft>
-              <a:buClrTx/>
-              <a:buSzTx/>
-              <a:buFontTx/>
-              <a:buNone/>
-              <a:tabLst/>
-              <a:defRPr/>
-            </a:pPr>
             <a:r>
               <a:rPr lang="de-CH" dirty="0" smtClean="0"/>
-              <a:t>Revenue Streams</a:t>
-            </a:r>
+              <a:t>Key </a:t>
+            </a:r>
+            <a:r>
+              <a:rPr lang="de-CH" dirty="0" err="1" smtClean="0"/>
+              <a:t>Ressources</a:t>
+            </a:r>
+            <a:endParaRPr lang="de-CH" dirty="0"/>
           </a:p>
         </p:txBody>
       </p:sp>
@@ -1320,7 +1421,7 @@
     </p:spTree>
     <p:extLst>
       <p:ext uri="{BB962C8B-B14F-4D97-AF65-F5344CB8AC3E}">
-        <p14:creationId xmlns:p14="http://schemas.microsoft.com/office/powerpoint/2010/main" val="1227994906"/>
+        <p14:creationId xmlns:p14="http://schemas.microsoft.com/office/powerpoint/2010/main" val="2653983063"/>
       </p:ext>
     </p:extLst>
   </p:cSld>
@@ -1374,35 +1475,27 @@
           <a:bodyPr/>
           <a:lstStyle/>
           <a:p>
-            <a:r>
-              <a:rPr lang="de-CH" dirty="0" err="1" smtClean="0"/>
-              <a:t>Cost</a:t>
-            </a:r>
-            <a:r>
-              <a:rPr lang="de-CH" baseline="0" dirty="0" smtClean="0"/>
-              <a:t> </a:t>
-            </a:r>
-            <a:r>
-              <a:rPr lang="de-CH" baseline="0" dirty="0" err="1" smtClean="0"/>
-              <a:t>Structure</a:t>
-            </a:r>
-            <a:r>
-              <a:rPr lang="de-CH" baseline="0" dirty="0" smtClean="0"/>
-              <a:t> – </a:t>
-            </a:r>
-            <a:r>
-              <a:rPr lang="de-CH" baseline="0" dirty="0" err="1" smtClean="0"/>
-              <a:t>fixed</a:t>
-            </a:r>
-            <a:r>
-              <a:rPr lang="de-CH" baseline="0" dirty="0" smtClean="0"/>
-              <a:t> </a:t>
-            </a:r>
-            <a:r>
-              <a:rPr lang="de-CH" baseline="0" dirty="0" err="1" smtClean="0"/>
-              <a:t>Costs</a:t>
-            </a:r>
-            <a:endParaRPr lang="de-CH" dirty="0"/>
+            <a:pPr marL="0" marR="0" lvl="0" indent="0" algn="l" defTabSz="914400" rtl="0" eaLnBrk="1" fontAlgn="auto" latinLnBrk="0" hangingPunct="1">
+              <a:lnSpc>
+                <a:spcPct val="100000"/>
+              </a:lnSpc>
+              <a:spcBef>
+                <a:spcPts val="0"/>
+              </a:spcBef>
+              <a:spcAft>
+                <a:spcPts val="0"/>
+              </a:spcAft>
+              <a:buClrTx/>
+              <a:buSzTx/>
+              <a:buFontTx/>
+              <a:buNone/>
+              <a:tabLst/>
+              <a:defRPr/>
+            </a:pPr>
+            <a:r>
+              <a:rPr lang="de-CH" dirty="0" smtClean="0"/>
+              <a:t>Revenue Streams</a:t>
+            </a:r>
           </a:p>
         </p:txBody>
       </p:sp>
@@ -1432,7 +1525,7 @@
     </p:spTree>
     <p:extLst>
       <p:ext uri="{BB962C8B-B14F-4D97-AF65-F5344CB8AC3E}">
-        <p14:creationId xmlns:p14="http://schemas.microsoft.com/office/powerpoint/2010/main" val="308482155"/>
+        <p14:creationId xmlns:p14="http://schemas.microsoft.com/office/powerpoint/2010/main" val="1227994906"/>
       </p:ext>
     </p:extLst>
   </p:cSld>
@@ -1573,7 +1666,7 @@
           <a:p>
             <a:fld id="{80A92051-9F01-459E-BB84-2389E6066350}" type="datetimeFigureOut">
               <a:rPr lang="de-CH" smtClean="0"/>
-              <a:t>22.11.2019</a:t>
+              <a:t>19.12.2019</a:t>
             </a:fld>
             <a:endParaRPr lang="de-CH"/>
           </a:p>
@@ -1743,7 +1836,7 @@
           <a:p>
             <a:fld id="{80A92051-9F01-459E-BB84-2389E6066350}" type="datetimeFigureOut">
               <a:rPr lang="de-CH" smtClean="0"/>
-              <a:t>22.11.2019</a:t>
+              <a:t>19.12.2019</a:t>
             </a:fld>
             <a:endParaRPr lang="de-CH"/>
           </a:p>
@@ -1923,7 +2016,7 @@
           <a:p>
             <a:fld id="{80A92051-9F01-459E-BB84-2389E6066350}" type="datetimeFigureOut">
               <a:rPr lang="de-CH" smtClean="0"/>
-              <a:t>22.11.2019</a:t>
+              <a:t>19.12.2019</a:t>
             </a:fld>
             <a:endParaRPr lang="de-CH"/>
           </a:p>
@@ -2093,7 +2186,7 @@
           <a:p>
             <a:fld id="{80A92051-9F01-459E-BB84-2389E6066350}" type="datetimeFigureOut">
               <a:rPr lang="de-CH" smtClean="0"/>
-              <a:t>22.11.2019</a:t>
+              <a:t>19.12.2019</a:t>
             </a:fld>
             <a:endParaRPr lang="de-CH"/>
           </a:p>
@@ -2339,7 +2432,7 @@
           <a:p>
             <a:fld id="{80A92051-9F01-459E-BB84-2389E6066350}" type="datetimeFigureOut">
               <a:rPr lang="de-CH" smtClean="0"/>
-              <a:t>22.11.2019</a:t>
+              <a:t>19.12.2019</a:t>
             </a:fld>
             <a:endParaRPr lang="de-CH"/>
           </a:p>
@@ -2571,7 +2664,7 @@
           <a:p>
             <a:fld id="{80A92051-9F01-459E-BB84-2389E6066350}" type="datetimeFigureOut">
               <a:rPr lang="de-CH" smtClean="0"/>
-              <a:t>22.11.2019</a:t>
+              <a:t>19.12.2019</a:t>
             </a:fld>
             <a:endParaRPr lang="de-CH"/>
           </a:p>
@@ -2938,7 +3031,7 @@
           <a:p>
             <a:fld id="{80A92051-9F01-459E-BB84-2389E6066350}" type="datetimeFigureOut">
               <a:rPr lang="de-CH" smtClean="0"/>
-              <a:t>22.11.2019</a:t>
+              <a:t>19.12.2019</a:t>
             </a:fld>
             <a:endParaRPr lang="de-CH"/>
           </a:p>
@@ -3056,7 +3149,7 @@
           <a:p>
             <a:fld id="{80A92051-9F01-459E-BB84-2389E6066350}" type="datetimeFigureOut">
               <a:rPr lang="de-CH" smtClean="0"/>
-              <a:t>22.11.2019</a:t>
+              <a:t>19.12.2019</a:t>
             </a:fld>
             <a:endParaRPr lang="de-CH"/>
           </a:p>
@@ -3151,7 +3244,7 @@
           <a:p>
             <a:fld id="{80A92051-9F01-459E-BB84-2389E6066350}" type="datetimeFigureOut">
               <a:rPr lang="de-CH" smtClean="0"/>
-              <a:t>22.11.2019</a:t>
+              <a:t>19.12.2019</a:t>
             </a:fld>
             <a:endParaRPr lang="de-CH"/>
           </a:p>
@@ -3428,7 +3521,7 @@
           <a:p>
             <a:fld id="{80A92051-9F01-459E-BB84-2389E6066350}" type="datetimeFigureOut">
               <a:rPr lang="de-CH" smtClean="0"/>
-              <a:t>22.11.2019</a:t>
+              <a:t>19.12.2019</a:t>
             </a:fld>
             <a:endParaRPr lang="de-CH"/>
           </a:p>
@@ -3681,7 +3774,7 @@
           <a:p>
             <a:fld id="{80A92051-9F01-459E-BB84-2389E6066350}" type="datetimeFigureOut">
               <a:rPr lang="de-CH" smtClean="0"/>
-              <a:t>22.11.2019</a:t>
+              <a:t>19.12.2019</a:t>
             </a:fld>
             <a:endParaRPr lang="de-CH"/>
           </a:p>
@@ -3894,7 +3987,7 @@
           <a:p>
             <a:fld id="{80A92051-9F01-459E-BB84-2389E6066350}" type="datetimeFigureOut">
               <a:rPr lang="de-CH" smtClean="0"/>
-              <a:t>22.11.2019</a:t>
+              <a:t>19.12.2019</a:t>
             </a:fld>
             <a:endParaRPr lang="de-CH"/>
           </a:p>
@@ -4299,28 +4392,295 @@
           <a:chExt cx="0" cy="0"/>
         </a:xfrm>
       </p:grpSpPr>
-      <p:sp>
-        <p:nvSpPr>
-          <p:cNvPr id="4" name="Rechteck 3"/>
+      <p:pic>
+        <p:nvPicPr>
+          <p:cNvPr id="4" name="Grafik 3"/>
+          <p:cNvPicPr>
+            <a:picLocks noChangeAspect="1"/>
+          </p:cNvPicPr>
+          <p:nvPr/>
+        </p:nvPicPr>
+        <p:blipFill rotWithShape="1">
+          <a:blip r:embed="rId3">
+            <a:extLst>
+              <a:ext uri="{28A0092B-C50C-407E-A947-70E740481C1C}">
+                <a14:useLocalDpi xmlns:a14="http://schemas.microsoft.com/office/drawing/2010/main" val="0"/>
+              </a:ext>
+            </a:extLst>
+          </a:blip>
+          <a:srcRect t="8647" b="1862"/>
+          <a:stretch/>
+        </p:blipFill>
+        <p:spPr>
+          <a:xfrm>
+            <a:off x="1" y="138518"/>
+            <a:ext cx="12191999" cy="6591797"/>
+          </a:xfrm>
+          <a:prstGeom prst="rect">
+            <a:avLst/>
+          </a:prstGeom>
+        </p:spPr>
+      </p:pic>
+      <p:sp>
+        <p:nvSpPr>
+          <p:cNvPr id="5" name="Rechteck 4"/>
           <p:cNvSpPr/>
           <p:nvPr/>
         </p:nvSpPr>
         <p:spPr>
           <a:xfrm>
-            <a:off x="57664" y="57665"/>
-            <a:ext cx="12068433" cy="6738552"/>
+            <a:off x="92869" y="228600"/>
+            <a:ext cx="983456" cy="116681"/>
           </a:xfrm>
           <a:prstGeom prst="rect">
             <a:avLst/>
           </a:prstGeom>
           <a:solidFill>
-            <a:schemeClr val="bg1">
-              <a:lumMod val="95000"/>
+            <a:schemeClr val="bg1"/>
+          </a:solidFill>
+          <a:ln>
+            <a:noFill/>
+          </a:ln>
+        </p:spPr>
+        <p:style>
+          <a:lnRef idx="2">
+            <a:schemeClr val="accent1">
+              <a:shade val="50000"/>
             </a:schemeClr>
+          </a:lnRef>
+          <a:fillRef idx="1">
+            <a:schemeClr val="accent1"/>
+          </a:fillRef>
+          <a:effectRef idx="0">
+            <a:schemeClr val="accent1"/>
+          </a:effectRef>
+          <a:fontRef idx="minor">
+            <a:schemeClr val="lt1"/>
+          </a:fontRef>
+        </p:style>
+        <p:txBody>
+          <a:bodyPr rtlCol="0" anchor="ctr"/>
+          <a:lstStyle/>
+          <a:p>
+            <a:pPr algn="ctr"/>
+            <a:r>
+              <a:rPr lang="de-CH" sz="600" dirty="0" smtClean="0">
+                <a:solidFill>
+                  <a:schemeClr val="tx1">
+                    <a:lumMod val="50000"/>
+                    <a:lumOff val="50000"/>
+                  </a:schemeClr>
+                </a:solidFill>
+              </a:rPr>
+              <a:t>Business Model Design</a:t>
+            </a:r>
+            <a:endParaRPr lang="de-CH" sz="600" dirty="0">
+              <a:solidFill>
+                <a:schemeClr val="tx1">
+                  <a:lumMod val="50000"/>
+                  <a:lumOff val="50000"/>
+                </a:schemeClr>
+              </a:solidFill>
+            </a:endParaRPr>
+          </a:p>
+        </p:txBody>
+      </p:sp>
+      <p:sp>
+        <p:nvSpPr>
+          <p:cNvPr id="6" name="Rechteck 5"/>
+          <p:cNvSpPr/>
+          <p:nvPr/>
+        </p:nvSpPr>
+        <p:spPr>
+          <a:xfrm>
+            <a:off x="92869" y="377022"/>
+            <a:ext cx="983456" cy="116681"/>
+          </a:xfrm>
+          <a:prstGeom prst="rect">
+            <a:avLst/>
+          </a:prstGeom>
+          <a:solidFill>
+            <a:schemeClr val="bg1"/>
           </a:solidFill>
-          <a:ln w="76200">
+          <a:ln>
+            <a:noFill/>
+          </a:ln>
+        </p:spPr>
+        <p:style>
+          <a:lnRef idx="2">
+            <a:schemeClr val="accent1">
+              <a:shade val="50000"/>
+            </a:schemeClr>
+          </a:lnRef>
+          <a:fillRef idx="1">
+            <a:schemeClr val="accent1"/>
+          </a:fillRef>
+          <a:effectRef idx="0">
+            <a:schemeClr val="accent1"/>
+          </a:effectRef>
+          <a:fontRef idx="minor">
+            <a:schemeClr val="lt1"/>
+          </a:fontRef>
+        </p:style>
+        <p:txBody>
+          <a:bodyPr rtlCol="0" anchor="ctr"/>
+          <a:lstStyle/>
+          <a:p>
+            <a:pPr algn="ctr"/>
+            <a:r>
+              <a:rPr lang="de-CH" sz="600" dirty="0" smtClean="0">
+                <a:solidFill>
+                  <a:schemeClr val="tx1">
+                    <a:lumMod val="50000"/>
+                    <a:lumOff val="50000"/>
+                  </a:schemeClr>
+                </a:solidFill>
+              </a:rPr>
+              <a:t>Business Model </a:t>
+            </a:r>
+            <a:r>
+              <a:rPr lang="de-CH" sz="600" dirty="0" err="1" smtClean="0">
+                <a:solidFill>
+                  <a:schemeClr val="tx1">
+                    <a:lumMod val="50000"/>
+                    <a:lumOff val="50000"/>
+                  </a:schemeClr>
+                </a:solidFill>
+              </a:rPr>
+              <a:t>Canvas</a:t>
+            </a:r>
+            <a:endParaRPr lang="de-CH" sz="600" dirty="0">
+              <a:solidFill>
+                <a:schemeClr val="tx1">
+                  <a:lumMod val="50000"/>
+                  <a:lumOff val="50000"/>
+                </a:schemeClr>
+              </a:solidFill>
+            </a:endParaRPr>
+          </a:p>
+        </p:txBody>
+      </p:sp>
+      <p:pic>
+        <p:nvPicPr>
+          <p:cNvPr id="7" name="Grafik 6"/>
+          <p:cNvPicPr>
+            <a:picLocks noChangeAspect="1"/>
+          </p:cNvPicPr>
+          <p:nvPr/>
+        </p:nvPicPr>
+        <p:blipFill rotWithShape="1">
+          <a:blip r:embed="rId4"/>
+          <a:srcRect l="13227" t="18266" r="13990" b="13385"/>
+          <a:stretch/>
+        </p:blipFill>
+        <p:spPr>
+          <a:xfrm>
+            <a:off x="1221376" y="659027"/>
+            <a:ext cx="10863544" cy="5489049"/>
+          </a:xfrm>
+          <a:prstGeom prst="rect">
+            <a:avLst/>
+          </a:prstGeom>
+        </p:spPr>
+      </p:pic>
+      <p:grpSp>
+        <p:nvGrpSpPr>
+          <p:cNvPr id="11" name="Gruppieren 10"/>
+          <p:cNvGrpSpPr/>
+          <p:nvPr/>
+        </p:nvGrpSpPr>
+        <p:grpSpPr>
+          <a:xfrm>
+            <a:off x="1827101" y="4862974"/>
+            <a:ext cx="1262087" cy="709924"/>
+            <a:chOff x="1827101" y="4904163"/>
+            <a:chExt cx="1262087" cy="709924"/>
+          </a:xfrm>
+        </p:grpSpPr>
+        <p:pic>
+          <p:nvPicPr>
+            <p:cNvPr id="9" name="Grafik 8"/>
+            <p:cNvPicPr>
+              <a:picLocks noChangeAspect="1"/>
+            </p:cNvPicPr>
+            <p:nvPr/>
+          </p:nvPicPr>
+          <p:blipFill>
+            <a:blip r:embed="rId5" cstate="print">
+              <a:extLst>
+                <a:ext uri="{28A0092B-C50C-407E-A947-70E740481C1C}">
+                  <a14:useLocalDpi xmlns:a14="http://schemas.microsoft.com/office/drawing/2010/main" val="0"/>
+                </a:ext>
+              </a:extLst>
+            </a:blip>
+            <a:stretch>
+              <a:fillRect/>
+            </a:stretch>
+          </p:blipFill>
+          <p:spPr>
+            <a:xfrm>
+              <a:off x="1827101" y="4904163"/>
+              <a:ext cx="1262087" cy="709924"/>
+            </a:xfrm>
+            <a:prstGeom prst="rect">
+              <a:avLst/>
+            </a:prstGeom>
+          </p:spPr>
+        </p:pic>
+        <p:sp>
+          <p:nvSpPr>
+            <p:cNvPr id="10" name="Textfeld 9"/>
+            <p:cNvSpPr txBox="1"/>
+            <p:nvPr/>
+          </p:nvSpPr>
+          <p:spPr>
+            <a:xfrm>
+              <a:off x="1827101" y="5120625"/>
+              <a:ext cx="1262087" cy="276999"/>
+            </a:xfrm>
+            <a:prstGeom prst="rect">
+              <a:avLst/>
+            </a:prstGeom>
+            <a:noFill/>
+          </p:spPr>
+          <p:txBody>
+            <a:bodyPr wrap="square" rtlCol="0">
+              <a:spAutoFit/>
+            </a:bodyPr>
+            <a:lstStyle/>
+            <a:p>
+              <a:pPr algn="ctr"/>
+              <a:r>
+                <a:rPr lang="de-CH" sz="1200" dirty="0" err="1" smtClean="0"/>
+                <a:t>Salaries</a:t>
+              </a:r>
+              <a:endParaRPr lang="de-CH" dirty="0"/>
+            </a:p>
+          </p:txBody>
+        </p:sp>
+      </p:grpSp>
+      <p:sp>
+        <p:nvSpPr>
+          <p:cNvPr id="12" name="Rechteck 11"/>
+          <p:cNvSpPr/>
+          <p:nvPr/>
+        </p:nvSpPr>
+        <p:spPr>
+          <a:xfrm>
+            <a:off x="92869" y="493704"/>
+            <a:ext cx="1068666" cy="568978"/>
+          </a:xfrm>
+          <a:prstGeom prst="rect">
+            <a:avLst/>
+          </a:prstGeom>
+          <a:solidFill>
+            <a:schemeClr val="bg1"/>
+          </a:solidFill>
+          <a:ln w="6350">
             <a:solidFill>
-              <a:schemeClr val="accent4"/>
+              <a:schemeClr val="bg2">
+                <a:lumMod val="75000"/>
+              </a:schemeClr>
             </a:solidFill>
           </a:ln>
         </p:spPr>
@@ -4341,6 +4701,293 @@
           </a:fontRef>
         </p:style>
         <p:txBody>
+          <a:bodyPr rtlCol="0" anchor="t"/>
+          <a:lstStyle/>
+          <a:p>
+            <a:pPr algn="ctr"/>
+            <a:r>
+              <a:rPr lang="de-CH" sz="800" dirty="0" err="1" smtClean="0">
+                <a:solidFill>
+                  <a:schemeClr val="tx1">
+                    <a:lumMod val="50000"/>
+                    <a:lumOff val="50000"/>
+                  </a:schemeClr>
+                </a:solidFill>
+              </a:rPr>
+              <a:t>Cost</a:t>
+            </a:r>
+            <a:r>
+              <a:rPr lang="de-CH" sz="800" dirty="0" smtClean="0">
+                <a:solidFill>
+                  <a:schemeClr val="tx1">
+                    <a:lumMod val="50000"/>
+                    <a:lumOff val="50000"/>
+                  </a:schemeClr>
+                </a:solidFill>
+              </a:rPr>
+              <a:t> </a:t>
+            </a:r>
+            <a:r>
+              <a:rPr lang="de-CH" sz="800" dirty="0" err="1" smtClean="0">
+                <a:solidFill>
+                  <a:schemeClr val="tx1">
+                    <a:lumMod val="50000"/>
+                    <a:lumOff val="50000"/>
+                  </a:schemeClr>
+                </a:solidFill>
+              </a:rPr>
+              <a:t>Structure</a:t>
+            </a:r>
+            <a:endParaRPr lang="de-CH" sz="800" dirty="0">
+              <a:solidFill>
+                <a:schemeClr val="tx1">
+                  <a:lumMod val="50000"/>
+                  <a:lumOff val="50000"/>
+                </a:schemeClr>
+              </a:solidFill>
+            </a:endParaRPr>
+          </a:p>
+        </p:txBody>
+      </p:sp>
+      <p:grpSp>
+        <p:nvGrpSpPr>
+          <p:cNvPr id="14" name="Gruppieren 13"/>
+          <p:cNvGrpSpPr/>
+          <p:nvPr/>
+        </p:nvGrpSpPr>
+        <p:grpSpPr>
+          <a:xfrm>
+            <a:off x="142059" y="708703"/>
+            <a:ext cx="468629" cy="288147"/>
+            <a:chOff x="1827101" y="4881586"/>
+            <a:chExt cx="1262087" cy="776025"/>
+          </a:xfrm>
+        </p:grpSpPr>
+        <p:pic>
+          <p:nvPicPr>
+            <p:cNvPr id="15" name="Grafik 14"/>
+            <p:cNvPicPr>
+              <a:picLocks noChangeAspect="1"/>
+            </p:cNvPicPr>
+            <p:nvPr/>
+          </p:nvPicPr>
+          <p:blipFill>
+            <a:blip r:embed="rId5" cstate="print">
+              <a:extLst>
+                <a:ext uri="{28A0092B-C50C-407E-A947-70E740481C1C}">
+                  <a14:useLocalDpi xmlns:a14="http://schemas.microsoft.com/office/drawing/2010/main" val="0"/>
+                </a:ext>
+              </a:extLst>
+            </a:blip>
+            <a:stretch>
+              <a:fillRect/>
+            </a:stretch>
+          </p:blipFill>
+          <p:spPr>
+            <a:xfrm>
+              <a:off x="1827101" y="4904163"/>
+              <a:ext cx="1262087" cy="709924"/>
+            </a:xfrm>
+            <a:prstGeom prst="rect">
+              <a:avLst/>
+            </a:prstGeom>
+          </p:spPr>
+        </p:pic>
+        <p:sp>
+          <p:nvSpPr>
+            <p:cNvPr id="16" name="Textfeld 15"/>
+            <p:cNvSpPr txBox="1"/>
+            <p:nvPr/>
+          </p:nvSpPr>
+          <p:spPr>
+            <a:xfrm>
+              <a:off x="1827101" y="4881586"/>
+              <a:ext cx="1262087" cy="776025"/>
+            </a:xfrm>
+            <a:prstGeom prst="rect">
+              <a:avLst/>
+            </a:prstGeom>
+            <a:noFill/>
+          </p:spPr>
+          <p:txBody>
+            <a:bodyPr wrap="square" lIns="36000" tIns="36000" rIns="36000" bIns="36000" rtlCol="0">
+              <a:spAutoFit/>
+            </a:bodyPr>
+            <a:lstStyle/>
+            <a:p>
+              <a:pPr algn="ctr"/>
+              <a:r>
+                <a:rPr lang="de-CH" sz="700" dirty="0" smtClean="0"/>
+                <a:t>Fixed </a:t>
+              </a:r>
+              <a:r>
+                <a:rPr lang="de-CH" sz="700" dirty="0" err="1" smtClean="0"/>
+                <a:t>Costs</a:t>
+              </a:r>
+              <a:endParaRPr lang="de-CH" sz="900" dirty="0"/>
+            </a:p>
+          </p:txBody>
+        </p:sp>
+      </p:grpSp>
+      <p:grpSp>
+        <p:nvGrpSpPr>
+          <p:cNvPr id="17" name="Gruppieren 16"/>
+          <p:cNvGrpSpPr/>
+          <p:nvPr/>
+        </p:nvGrpSpPr>
+        <p:grpSpPr>
+          <a:xfrm>
+            <a:off x="653905" y="705178"/>
+            <a:ext cx="468629" cy="288147"/>
+            <a:chOff x="1827101" y="4872103"/>
+            <a:chExt cx="1262087" cy="776025"/>
+          </a:xfrm>
+        </p:grpSpPr>
+        <p:pic>
+          <p:nvPicPr>
+            <p:cNvPr id="18" name="Grafik 17"/>
+            <p:cNvPicPr>
+              <a:picLocks noChangeAspect="1"/>
+            </p:cNvPicPr>
+            <p:nvPr/>
+          </p:nvPicPr>
+          <p:blipFill>
+            <a:blip r:embed="rId6" cstate="print">
+              <a:extLst>
+                <a:ext uri="{28A0092B-C50C-407E-A947-70E740481C1C}">
+                  <a14:useLocalDpi xmlns:a14="http://schemas.microsoft.com/office/drawing/2010/main" val="0"/>
+                </a:ext>
+              </a:extLst>
+            </a:blip>
+            <a:stretch>
+              <a:fillRect/>
+            </a:stretch>
+          </p:blipFill>
+          <p:spPr>
+            <a:xfrm>
+              <a:off x="1827104" y="4904163"/>
+              <a:ext cx="1262082" cy="709924"/>
+            </a:xfrm>
+            <a:prstGeom prst="rect">
+              <a:avLst/>
+            </a:prstGeom>
+          </p:spPr>
+        </p:pic>
+        <p:sp>
+          <p:nvSpPr>
+            <p:cNvPr id="19" name="Textfeld 18"/>
+            <p:cNvSpPr txBox="1"/>
+            <p:nvPr/>
+          </p:nvSpPr>
+          <p:spPr>
+            <a:xfrm>
+              <a:off x="1827101" y="4872103"/>
+              <a:ext cx="1262087" cy="776025"/>
+            </a:xfrm>
+            <a:prstGeom prst="rect">
+              <a:avLst/>
+            </a:prstGeom>
+            <a:noFill/>
+          </p:spPr>
+          <p:txBody>
+            <a:bodyPr wrap="square" lIns="36000" tIns="36000" rIns="36000" bIns="36000" rtlCol="0">
+              <a:spAutoFit/>
+            </a:bodyPr>
+            <a:lstStyle/>
+            <a:p>
+              <a:pPr algn="ctr"/>
+              <a:r>
+                <a:rPr lang="de-CH" sz="700" dirty="0" smtClean="0"/>
+                <a:t>Variable </a:t>
+              </a:r>
+              <a:r>
+                <a:rPr lang="de-CH" sz="700" dirty="0" err="1" smtClean="0"/>
+                <a:t>Costs</a:t>
+              </a:r>
+              <a:endParaRPr lang="de-CH" sz="900" dirty="0"/>
+            </a:p>
+          </p:txBody>
+        </p:sp>
+      </p:grpSp>
+    </p:spTree>
+    <p:extLst>
+      <p:ext uri="{BB962C8B-B14F-4D97-AF65-F5344CB8AC3E}">
+        <p14:creationId xmlns:p14="http://schemas.microsoft.com/office/powerpoint/2010/main" val="1019539180"/>
+      </p:ext>
+    </p:extLst>
+  </p:cSld>
+  <p:clrMapOvr>
+    <a:masterClrMapping/>
+  </p:clrMapOvr>
+  <p:timing>
+    <p:tnLst>
+      <p:par>
+        <p:cTn id="1" dur="indefinite" restart="never" nodeType="tmRoot"/>
+      </p:par>
+    </p:tnLst>
+  </p:timing>
+</p:sld>
+</file>
+
+<file path=ppt/slides/slide10.xml><?xml version="1.0" encoding="utf-8"?>
+<p:sld xmlns:a="http://schemas.openxmlformats.org/drawingml/2006/main" xmlns:r="http://schemas.openxmlformats.org/officeDocument/2006/relationships" xmlns:p="http://schemas.openxmlformats.org/presentationml/2006/main">
+  <p:cSld>
+    <p:spTree>
+      <p:nvGrpSpPr>
+        <p:cNvPr id="1" name=""/>
+        <p:cNvGrpSpPr/>
+        <p:nvPr/>
+      </p:nvGrpSpPr>
+      <p:grpSpPr>
+        <a:xfrm>
+          <a:off x="0" y="0"/>
+          <a:ext cx="0" cy="0"/>
+          <a:chOff x="0" y="0"/>
+          <a:chExt cx="0" cy="0"/>
+        </a:xfrm>
+      </p:grpSpPr>
+      <p:sp>
+        <p:nvSpPr>
+          <p:cNvPr id="4" name="Rechteck 3"/>
+          <p:cNvSpPr/>
+          <p:nvPr/>
+        </p:nvSpPr>
+        <p:spPr>
+          <a:xfrm>
+            <a:off x="57664" y="57665"/>
+            <a:ext cx="12068433" cy="6738552"/>
+          </a:xfrm>
+          <a:prstGeom prst="rect">
+            <a:avLst/>
+          </a:prstGeom>
+          <a:solidFill>
+            <a:schemeClr val="bg1">
+              <a:lumMod val="95000"/>
+            </a:schemeClr>
+          </a:solidFill>
+          <a:ln w="76200">
+            <a:solidFill>
+              <a:srgbClr val="FF0000"/>
+            </a:solidFill>
+          </a:ln>
+        </p:spPr>
+        <p:style>
+          <a:lnRef idx="2">
+            <a:schemeClr val="accent1">
+              <a:shade val="50000"/>
+            </a:schemeClr>
+          </a:lnRef>
+          <a:fillRef idx="1">
+            <a:schemeClr val="accent1"/>
+          </a:fillRef>
+          <a:effectRef idx="0">
+            <a:schemeClr val="accent1"/>
+          </a:effectRef>
+          <a:fontRef idx="minor">
+            <a:schemeClr val="lt1"/>
+          </a:fontRef>
+        </p:style>
+        <p:txBody>
           <a:bodyPr rtlCol="0" anchor="ctr"/>
           <a:lstStyle/>
           <a:p>
@@ -4359,6 +5006,13 @@
         </p:nvPicPr>
         <p:blipFill>
           <a:blip r:embed="rId3">
+            <a:duotone>
+              <a:schemeClr val="accent1">
+                <a:shade val="45000"/>
+                <a:satMod val="135000"/>
+              </a:schemeClr>
+              <a:prstClr val="white"/>
+            </a:duotone>
             <a:extLst>
               <a:ext uri="{28A0092B-C50C-407E-A947-70E740481C1C}">
                 <a14:useLocalDpi xmlns:a14="http://schemas.microsoft.com/office/drawing/2010/main" val="0"/>
@@ -4381,14 +5035,14 @@
       </p:pic>
       <p:sp>
         <p:nvSpPr>
-          <p:cNvPr id="5" name="Rechteck 4"/>
+          <p:cNvPr id="6" name="Rechteck 5"/>
           <p:cNvSpPr/>
           <p:nvPr/>
         </p:nvSpPr>
         <p:spPr>
           <a:xfrm>
-            <a:off x="2355904" y="894664"/>
-            <a:ext cx="7199870" cy="5183793"/>
+            <a:off x="2224334" y="944415"/>
+            <a:ext cx="7199870" cy="4965052"/>
           </a:xfrm>
           <a:prstGeom prst="rect">
             <a:avLst/>
@@ -4430,17 +5084,24 @@
     </p:spTree>
     <p:extLst>
       <p:ext uri="{BB962C8B-B14F-4D97-AF65-F5344CB8AC3E}">
-        <p14:creationId xmlns:p14="http://schemas.microsoft.com/office/powerpoint/2010/main" val="3300122313"/>
+        <p14:creationId xmlns:p14="http://schemas.microsoft.com/office/powerpoint/2010/main" val="1653183672"/>
       </p:ext>
     </p:extLst>
   </p:cSld>
   <p:clrMapOvr>
     <a:masterClrMapping/>
   </p:clrMapOvr>
+  <p:timing>
+    <p:tnLst>
+      <p:par>
+        <p:cTn id="1" dur="indefinite" restart="never" nodeType="tmRoot"/>
+      </p:par>
+    </p:tnLst>
+  </p:timing>
 </p:sld>
 </file>
 
-<file path=ppt/slides/slide10.xml><?xml version="1.0" encoding="utf-8"?>
+<file path=ppt/slides/slide11.xml><?xml version="1.0" encoding="utf-8"?>
 <p:sld xmlns:a="http://schemas.openxmlformats.org/drawingml/2006/main" xmlns:r="http://schemas.openxmlformats.org/officeDocument/2006/relationships" xmlns:p="http://schemas.openxmlformats.org/presentationml/2006/main">
   <p:cSld>
     <p:spTree>
@@ -4613,6 +5274,171 @@
 </file>
 
 <file path=ppt/slides/slide2.xml><?xml version="1.0" encoding="utf-8"?>
+<p:sld xmlns:a="http://schemas.openxmlformats.org/drawingml/2006/main" xmlns:r="http://schemas.openxmlformats.org/officeDocument/2006/relationships" xmlns:p="http://schemas.openxmlformats.org/presentationml/2006/main">
+  <p:cSld>
+    <p:spTree>
+      <p:nvGrpSpPr>
+        <p:cNvPr id="1" name=""/>
+        <p:cNvGrpSpPr/>
+        <p:nvPr/>
+      </p:nvGrpSpPr>
+      <p:grpSpPr>
+        <a:xfrm>
+          <a:off x="0" y="0"/>
+          <a:ext cx="0" cy="0"/>
+          <a:chOff x="0" y="0"/>
+          <a:chExt cx="0" cy="0"/>
+        </a:xfrm>
+      </p:grpSpPr>
+      <p:sp>
+        <p:nvSpPr>
+          <p:cNvPr id="4" name="Rechteck 3"/>
+          <p:cNvSpPr/>
+          <p:nvPr/>
+        </p:nvSpPr>
+        <p:spPr>
+          <a:xfrm>
+            <a:off x="57664" y="57665"/>
+            <a:ext cx="12068433" cy="6738552"/>
+          </a:xfrm>
+          <a:prstGeom prst="rect">
+            <a:avLst/>
+          </a:prstGeom>
+          <a:solidFill>
+            <a:schemeClr val="bg1">
+              <a:lumMod val="95000"/>
+            </a:schemeClr>
+          </a:solidFill>
+          <a:ln w="76200">
+            <a:solidFill>
+              <a:schemeClr val="accent4"/>
+            </a:solidFill>
+          </a:ln>
+        </p:spPr>
+        <p:style>
+          <a:lnRef idx="2">
+            <a:schemeClr val="accent1">
+              <a:shade val="50000"/>
+            </a:schemeClr>
+          </a:lnRef>
+          <a:fillRef idx="1">
+            <a:schemeClr val="accent1"/>
+          </a:fillRef>
+          <a:effectRef idx="0">
+            <a:schemeClr val="accent1"/>
+          </a:effectRef>
+          <a:fontRef idx="minor">
+            <a:schemeClr val="lt1"/>
+          </a:fontRef>
+        </p:style>
+        <p:txBody>
+          <a:bodyPr rtlCol="0" anchor="ctr"/>
+          <a:lstStyle/>
+          <a:p>
+            <a:pPr algn="ctr"/>
+            <a:endParaRPr lang="de-CH"/>
+          </a:p>
+        </p:txBody>
+      </p:sp>
+      <p:pic>
+        <p:nvPicPr>
+          <p:cNvPr id="2" name="Grafik 1"/>
+          <p:cNvPicPr>
+            <a:picLocks noChangeAspect="1"/>
+          </p:cNvPicPr>
+          <p:nvPr/>
+        </p:nvPicPr>
+        <p:blipFill>
+          <a:blip r:embed="rId3">
+            <a:extLst>
+              <a:ext uri="{28A0092B-C50C-407E-A947-70E740481C1C}">
+                <a14:useLocalDpi xmlns:a14="http://schemas.microsoft.com/office/drawing/2010/main" val="0"/>
+              </a:ext>
+            </a:extLst>
+          </a:blip>
+          <a:stretch>
+            <a:fillRect/>
+          </a:stretch>
+        </p:blipFill>
+        <p:spPr>
+          <a:xfrm>
+            <a:off x="3657905" y="990905"/>
+            <a:ext cx="4876190" cy="4876190"/>
+          </a:xfrm>
+          <a:prstGeom prst="rect">
+            <a:avLst/>
+          </a:prstGeom>
+        </p:spPr>
+      </p:pic>
+      <p:sp>
+        <p:nvSpPr>
+          <p:cNvPr id="5" name="Rechteck 4"/>
+          <p:cNvSpPr/>
+          <p:nvPr/>
+        </p:nvSpPr>
+        <p:spPr>
+          <a:xfrm>
+            <a:off x="2355904" y="894664"/>
+            <a:ext cx="7199870" cy="5183793"/>
+          </a:xfrm>
+          <a:prstGeom prst="rect">
+            <a:avLst/>
+          </a:prstGeom>
+          <a:solidFill>
+            <a:srgbClr val="F2F2F2">
+              <a:alpha val="60000"/>
+            </a:srgbClr>
+          </a:solidFill>
+          <a:ln w="76200">
+            <a:noFill/>
+          </a:ln>
+        </p:spPr>
+        <p:style>
+          <a:lnRef idx="2">
+            <a:schemeClr val="accent1">
+              <a:shade val="50000"/>
+            </a:schemeClr>
+          </a:lnRef>
+          <a:fillRef idx="1">
+            <a:schemeClr val="accent1"/>
+          </a:fillRef>
+          <a:effectRef idx="0">
+            <a:schemeClr val="accent1"/>
+          </a:effectRef>
+          <a:fontRef idx="minor">
+            <a:schemeClr val="lt1"/>
+          </a:fontRef>
+        </p:style>
+        <p:txBody>
+          <a:bodyPr rtlCol="0" anchor="ctr"/>
+          <a:lstStyle/>
+          <a:p>
+            <a:pPr algn="ctr"/>
+            <a:endParaRPr lang="de-CH"/>
+          </a:p>
+        </p:txBody>
+      </p:sp>
+    </p:spTree>
+    <p:extLst>
+      <p:ext uri="{BB962C8B-B14F-4D97-AF65-F5344CB8AC3E}">
+        <p14:creationId xmlns:p14="http://schemas.microsoft.com/office/powerpoint/2010/main" val="3300122313"/>
+      </p:ext>
+    </p:extLst>
+  </p:cSld>
+  <p:clrMapOvr>
+    <a:masterClrMapping/>
+  </p:clrMapOvr>
+  <p:timing>
+    <p:tnLst>
+      <p:par>
+        <p:cTn id="1" dur="indefinite" restart="never" nodeType="tmRoot"/>
+      </p:par>
+    </p:tnLst>
+  </p:timing>
+</p:sld>
+</file>
+
+<file path=ppt/slides/slide3.xml><?xml version="1.0" encoding="utf-8"?>
 <p:sld xmlns:a="http://schemas.openxmlformats.org/drawingml/2006/main" xmlns:r="http://schemas.openxmlformats.org/officeDocument/2006/relationships" xmlns:p="http://schemas.openxmlformats.org/presentationml/2006/main">
   <p:cSld>
     <p:spTree>
@@ -4773,7 +5599,7 @@
 </p:sld>
 </file>
 
-<file path=ppt/slides/slide3.xml><?xml version="1.0" encoding="utf-8"?>
+<file path=ppt/slides/slide4.xml><?xml version="1.0" encoding="utf-8"?>
 <p:sld xmlns:a="http://schemas.openxmlformats.org/drawingml/2006/main" xmlns:r="http://schemas.openxmlformats.org/officeDocument/2006/relationships" xmlns:p="http://schemas.openxmlformats.org/presentationml/2006/main">
   <p:cSld>
     <p:spTree>
@@ -4931,7 +5757,7 @@
 </p:sld>
 </file>
 
-<file path=ppt/slides/slide4.xml><?xml version="1.0" encoding="utf-8"?>
+<file path=ppt/slides/slide5.xml><?xml version="1.0" encoding="utf-8"?>
 <p:sld xmlns:a="http://schemas.openxmlformats.org/drawingml/2006/main" xmlns:r="http://schemas.openxmlformats.org/officeDocument/2006/relationships" xmlns:p="http://schemas.openxmlformats.org/presentationml/2006/main">
   <p:cSld>
     <p:spTree>
@@ -5091,7 +5917,7 @@
 </p:sld>
 </file>
 
-<file path=ppt/slides/slide5.xml><?xml version="1.0" encoding="utf-8"?>
+<file path=ppt/slides/slide6.xml><?xml version="1.0" encoding="utf-8"?>
 <p:sld xmlns:a="http://schemas.openxmlformats.org/drawingml/2006/main" xmlns:r="http://schemas.openxmlformats.org/officeDocument/2006/relationships" xmlns:p="http://schemas.openxmlformats.org/presentationml/2006/main">
   <p:cSld>
     <p:spTree>
@@ -5252,7 +6078,7 @@
 </p:sld>
 </file>
 
-<file path=ppt/slides/slide6.xml><?xml version="1.0" encoding="utf-8"?>
+<file path=ppt/slides/slide7.xml><?xml version="1.0" encoding="utf-8"?>
 <p:sld xmlns:a="http://schemas.openxmlformats.org/drawingml/2006/main" xmlns:r="http://schemas.openxmlformats.org/officeDocument/2006/relationships" xmlns:p="http://schemas.openxmlformats.org/presentationml/2006/main">
   <p:cSld>
     <p:spTree>
@@ -5410,7 +6236,7 @@
 </p:sld>
 </file>
 
-<file path=ppt/slides/slide7.xml><?xml version="1.0" encoding="utf-8"?>
+<file path=ppt/slides/slide8.xml><?xml version="1.0" encoding="utf-8"?>
 <p:sld xmlns:a="http://schemas.openxmlformats.org/drawingml/2006/main" xmlns:r="http://schemas.openxmlformats.org/officeDocument/2006/relationships" xmlns:p="http://schemas.openxmlformats.org/presentationml/2006/main">
   <p:cSld>
     <p:spTree>
@@ -5570,7 +6396,7 @@
 </p:sld>
 </file>
 
-<file path=ppt/slides/slide8.xml><?xml version="1.0" encoding="utf-8"?>
+<file path=ppt/slides/slide9.xml><?xml version="1.0" encoding="utf-8"?>
 <p:sld xmlns:a="http://schemas.openxmlformats.org/drawingml/2006/main" xmlns:r="http://schemas.openxmlformats.org/officeDocument/2006/relationships" xmlns:p="http://schemas.openxmlformats.org/presentationml/2006/main">
   <p:cSld>
     <p:spTree>
@@ -5725,178 +6551,6 @@
   <p:clrMapOvr>
     <a:masterClrMapping/>
   </p:clrMapOvr>
-</p:sld>
-</file>
-
-<file path=ppt/slides/slide9.xml><?xml version="1.0" encoding="utf-8"?>
-<p:sld xmlns:a="http://schemas.openxmlformats.org/drawingml/2006/main" xmlns:r="http://schemas.openxmlformats.org/officeDocument/2006/relationships" xmlns:p="http://schemas.openxmlformats.org/presentationml/2006/main">
-  <p:cSld>
-    <p:spTree>
-      <p:nvGrpSpPr>
-        <p:cNvPr id="1" name=""/>
-        <p:cNvGrpSpPr/>
-        <p:nvPr/>
-      </p:nvGrpSpPr>
-      <p:grpSpPr>
-        <a:xfrm>
-          <a:off x="0" y="0"/>
-          <a:ext cx="0" cy="0"/>
-          <a:chOff x="0" y="0"/>
-          <a:chExt cx="0" cy="0"/>
-        </a:xfrm>
-      </p:grpSpPr>
-      <p:sp>
-        <p:nvSpPr>
-          <p:cNvPr id="4" name="Rechteck 3"/>
-          <p:cNvSpPr/>
-          <p:nvPr/>
-        </p:nvSpPr>
-        <p:spPr>
-          <a:xfrm>
-            <a:off x="57664" y="57665"/>
-            <a:ext cx="12068433" cy="6738552"/>
-          </a:xfrm>
-          <a:prstGeom prst="rect">
-            <a:avLst/>
-          </a:prstGeom>
-          <a:solidFill>
-            <a:schemeClr val="bg1">
-              <a:lumMod val="95000"/>
-            </a:schemeClr>
-          </a:solidFill>
-          <a:ln w="76200">
-            <a:solidFill>
-              <a:srgbClr val="FF0000"/>
-            </a:solidFill>
-          </a:ln>
-        </p:spPr>
-        <p:style>
-          <a:lnRef idx="2">
-            <a:schemeClr val="accent1">
-              <a:shade val="50000"/>
-            </a:schemeClr>
-          </a:lnRef>
-          <a:fillRef idx="1">
-            <a:schemeClr val="accent1"/>
-          </a:fillRef>
-          <a:effectRef idx="0">
-            <a:schemeClr val="accent1"/>
-          </a:effectRef>
-          <a:fontRef idx="minor">
-            <a:schemeClr val="lt1"/>
-          </a:fontRef>
-        </p:style>
-        <p:txBody>
-          <a:bodyPr rtlCol="0" anchor="ctr"/>
-          <a:lstStyle/>
-          <a:p>
-            <a:pPr algn="ctr"/>
-            <a:endParaRPr lang="de-CH"/>
-          </a:p>
-        </p:txBody>
-      </p:sp>
-      <p:pic>
-        <p:nvPicPr>
-          <p:cNvPr id="2" name="Grafik 1"/>
-          <p:cNvPicPr>
-            <a:picLocks noChangeAspect="1"/>
-          </p:cNvPicPr>
-          <p:nvPr/>
-        </p:nvPicPr>
-        <p:blipFill>
-          <a:blip r:embed="rId3">
-            <a:duotone>
-              <a:schemeClr val="accent1">
-                <a:shade val="45000"/>
-                <a:satMod val="135000"/>
-              </a:schemeClr>
-              <a:prstClr val="white"/>
-            </a:duotone>
-            <a:extLst>
-              <a:ext uri="{28A0092B-C50C-407E-A947-70E740481C1C}">
-                <a14:useLocalDpi xmlns:a14="http://schemas.microsoft.com/office/drawing/2010/main" val="0"/>
-              </a:ext>
-            </a:extLst>
-          </a:blip>
-          <a:stretch>
-            <a:fillRect/>
-          </a:stretch>
-        </p:blipFill>
-        <p:spPr>
-          <a:xfrm>
-            <a:off x="3657905" y="990905"/>
-            <a:ext cx="4876190" cy="4876190"/>
-          </a:xfrm>
-          <a:prstGeom prst="rect">
-            <a:avLst/>
-          </a:prstGeom>
-        </p:spPr>
-      </p:pic>
-      <p:sp>
-        <p:nvSpPr>
-          <p:cNvPr id="6" name="Rechteck 5"/>
-          <p:cNvSpPr/>
-          <p:nvPr/>
-        </p:nvSpPr>
-        <p:spPr>
-          <a:xfrm>
-            <a:off x="2224334" y="944415"/>
-            <a:ext cx="7199870" cy="4965052"/>
-          </a:xfrm>
-          <a:prstGeom prst="rect">
-            <a:avLst/>
-          </a:prstGeom>
-          <a:solidFill>
-            <a:srgbClr val="F2F2F2">
-              <a:alpha val="60000"/>
-            </a:srgbClr>
-          </a:solidFill>
-          <a:ln w="76200">
-            <a:noFill/>
-          </a:ln>
-        </p:spPr>
-        <p:style>
-          <a:lnRef idx="2">
-            <a:schemeClr val="accent1">
-              <a:shade val="50000"/>
-            </a:schemeClr>
-          </a:lnRef>
-          <a:fillRef idx="1">
-            <a:schemeClr val="accent1"/>
-          </a:fillRef>
-          <a:effectRef idx="0">
-            <a:schemeClr val="accent1"/>
-          </a:effectRef>
-          <a:fontRef idx="minor">
-            <a:schemeClr val="lt1"/>
-          </a:fontRef>
-        </p:style>
-        <p:txBody>
-          <a:bodyPr rtlCol="0" anchor="ctr"/>
-          <a:lstStyle/>
-          <a:p>
-            <a:pPr algn="ctr"/>
-            <a:endParaRPr lang="de-CH"/>
-          </a:p>
-        </p:txBody>
-      </p:sp>
-    </p:spTree>
-    <p:extLst>
-      <p:ext uri="{BB962C8B-B14F-4D97-AF65-F5344CB8AC3E}">
-        <p14:creationId xmlns:p14="http://schemas.microsoft.com/office/powerpoint/2010/main" val="1653183672"/>
-      </p:ext>
-    </p:extLst>
-  </p:cSld>
-  <p:clrMapOvr>
-    <a:masterClrMapping/>
-  </p:clrMapOvr>
-  <p:timing>
-    <p:tnLst>
-      <p:par>
-        <p:cTn id="1" dur="indefinite" restart="never" nodeType="tmRoot"/>
-      </p:par>
-    </p:tnLst>
-  </p:timing>
 </p:sld>
 </file>
 

</xml_diff>